<commit_message>
Gen AI scalable APP backend Developed on AWS using bedrock,lambda,s3 and api gateway service and routing done for dev stage.
</commit_message>
<xml_diff>
--- a/Architecture/gen-ai-app-architecture.pptx
+++ b/Architecture/gen-ai-app-architecture.pptx
@@ -7,7 +7,20 @@
   <p:sldIdLst>
     <p:sldId id="256" r:id="rId2"/>
     <p:sldId id="257" r:id="rId3"/>
-    <p:sldId id="258" r:id="rId4"/>
+    <p:sldId id="271" r:id="rId4"/>
+    <p:sldId id="258" r:id="rId5"/>
+    <p:sldId id="259" r:id="rId6"/>
+    <p:sldId id="260" r:id="rId7"/>
+    <p:sldId id="262" r:id="rId8"/>
+    <p:sldId id="263" r:id="rId9"/>
+    <p:sldId id="261" r:id="rId10"/>
+    <p:sldId id="265" r:id="rId11"/>
+    <p:sldId id="266" r:id="rId12"/>
+    <p:sldId id="267" r:id="rId13"/>
+    <p:sldId id="268" r:id="rId14"/>
+    <p:sldId id="264" r:id="rId15"/>
+    <p:sldId id="269" r:id="rId16"/>
+    <p:sldId id="270" r:id="rId17"/>
   </p:sldIdLst>
   <p:sldSz cx="12192000" cy="6858000"/>
   <p:notesSz cx="6858000" cy="9144000"/>
@@ -106,6 +119,11 @@
       </a:defRPr>
     </a:lvl9pPr>
   </p:defaultTextStyle>
+  <p:extLst>
+    <p:ext uri="{EFAFB233-063F-42B5-8137-9DF3F51BA10A}">
+      <p15:sldGuideLst xmlns:p15="http://schemas.microsoft.com/office/powerpoint/2012/main"/>
+    </p:ext>
+  </p:extLst>
 </p:presentation>
 </file>
 
@@ -256,7 +274,7 @@
           <a:p>
             <a:fld id="{4FE6E451-323A-4F75-AF20-19C090BD0A95}" type="datetimeFigureOut">
               <a:rPr lang="en-US" smtClean="0"/>
-              <a:t>11/20/2024</a:t>
+              <a:t>1/13/2025</a:t>
             </a:fld>
             <a:endParaRPr lang="en-US"/>
           </a:p>
@@ -454,7 +472,7 @@
           <a:p>
             <a:fld id="{4FE6E451-323A-4F75-AF20-19C090BD0A95}" type="datetimeFigureOut">
               <a:rPr lang="en-US" smtClean="0"/>
-              <a:t>11/20/2024</a:t>
+              <a:t>1/13/2025</a:t>
             </a:fld>
             <a:endParaRPr lang="en-US"/>
           </a:p>
@@ -662,7 +680,7 @@
           <a:p>
             <a:fld id="{4FE6E451-323A-4F75-AF20-19C090BD0A95}" type="datetimeFigureOut">
               <a:rPr lang="en-US" smtClean="0"/>
-              <a:t>11/20/2024</a:t>
+              <a:t>1/13/2025</a:t>
             </a:fld>
             <a:endParaRPr lang="en-US"/>
           </a:p>
@@ -860,7 +878,7 @@
           <a:p>
             <a:fld id="{4FE6E451-323A-4F75-AF20-19C090BD0A95}" type="datetimeFigureOut">
               <a:rPr lang="en-US" smtClean="0"/>
-              <a:t>11/20/2024</a:t>
+              <a:t>1/13/2025</a:t>
             </a:fld>
             <a:endParaRPr lang="en-US"/>
           </a:p>
@@ -1135,7 +1153,7 @@
           <a:p>
             <a:fld id="{4FE6E451-323A-4F75-AF20-19C090BD0A95}" type="datetimeFigureOut">
               <a:rPr lang="en-US" smtClean="0"/>
-              <a:t>11/20/2024</a:t>
+              <a:t>1/13/2025</a:t>
             </a:fld>
             <a:endParaRPr lang="en-US"/>
           </a:p>
@@ -1400,7 +1418,7 @@
           <a:p>
             <a:fld id="{4FE6E451-323A-4F75-AF20-19C090BD0A95}" type="datetimeFigureOut">
               <a:rPr lang="en-US" smtClean="0"/>
-              <a:t>11/20/2024</a:t>
+              <a:t>1/13/2025</a:t>
             </a:fld>
             <a:endParaRPr lang="en-US"/>
           </a:p>
@@ -1812,7 +1830,7 @@
           <a:p>
             <a:fld id="{4FE6E451-323A-4F75-AF20-19C090BD0A95}" type="datetimeFigureOut">
               <a:rPr lang="en-US" smtClean="0"/>
-              <a:t>11/20/2024</a:t>
+              <a:t>1/13/2025</a:t>
             </a:fld>
             <a:endParaRPr lang="en-US"/>
           </a:p>
@@ -1953,7 +1971,7 @@
           <a:p>
             <a:fld id="{4FE6E451-323A-4F75-AF20-19C090BD0A95}" type="datetimeFigureOut">
               <a:rPr lang="en-US" smtClean="0"/>
-              <a:t>11/20/2024</a:t>
+              <a:t>1/13/2025</a:t>
             </a:fld>
             <a:endParaRPr lang="en-US"/>
           </a:p>
@@ -2066,7 +2084,7 @@
           <a:p>
             <a:fld id="{4FE6E451-323A-4F75-AF20-19C090BD0A95}" type="datetimeFigureOut">
               <a:rPr lang="en-US" smtClean="0"/>
-              <a:t>11/20/2024</a:t>
+              <a:t>1/13/2025</a:t>
             </a:fld>
             <a:endParaRPr lang="en-US"/>
           </a:p>
@@ -2377,7 +2395,7 @@
           <a:p>
             <a:fld id="{4FE6E451-323A-4F75-AF20-19C090BD0A95}" type="datetimeFigureOut">
               <a:rPr lang="en-US" smtClean="0"/>
-              <a:t>11/20/2024</a:t>
+              <a:t>1/13/2025</a:t>
             </a:fld>
             <a:endParaRPr lang="en-US"/>
           </a:p>
@@ -2665,7 +2683,7 @@
           <a:p>
             <a:fld id="{4FE6E451-323A-4F75-AF20-19C090BD0A95}" type="datetimeFigureOut">
               <a:rPr lang="en-US" smtClean="0"/>
-              <a:t>11/20/2024</a:t>
+              <a:t>1/13/2025</a:t>
             </a:fld>
             <a:endParaRPr lang="en-US"/>
           </a:p>
@@ -2906,7 +2924,7 @@
           <a:p>
             <a:fld id="{4FE6E451-323A-4F75-AF20-19C090BD0A95}" type="datetimeFigureOut">
               <a:rPr lang="en-US" smtClean="0"/>
-              <a:t>11/20/2024</a:t>
+              <a:t>1/13/2025</a:t>
             </a:fld>
             <a:endParaRPr lang="en-US"/>
           </a:p>
@@ -3392,7 +3410,7 @@
 </p:sld>
 </file>
 
-<file path=ppt/slides/slide2.xml><?xml version="1.0" encoding="utf-8"?>
+<file path=ppt/slides/slide10.xml><?xml version="1.0" encoding="utf-8"?>
 <p:sld xmlns:a="http://schemas.openxmlformats.org/drawingml/2006/main" xmlns:r="http://schemas.openxmlformats.org/officeDocument/2006/relationships" xmlns:p="http://schemas.openxmlformats.org/presentationml/2006/main">
   <p:cSld>
     <p:spTree>
@@ -3414,7 +3432,7 @@
           <p:cNvPr id="2" name="Title 1">
             <a:extLst>
               <a:ext uri="{FF2B5EF4-FFF2-40B4-BE49-F238E27FC236}">
-                <a16:creationId xmlns:a16="http://schemas.microsoft.com/office/drawing/2014/main" id="{855044C0-680E-48E7-99E1-AC059F74A5E5}"/>
+                <a16:creationId xmlns:a16="http://schemas.microsoft.com/office/drawing/2014/main" id="{A00F7517-87DD-40ED-9C7D-68432624864B}"/>
               </a:ext>
             </a:extLst>
           </p:cNvPr>
@@ -3430,81 +3448,892 @@
           <a:bodyPr/>
           <a:lstStyle/>
           <a:p>
+            <a:endParaRPr lang="en-US"/>
+          </a:p>
+        </p:txBody>
+      </p:sp>
+      <p:pic>
+        <p:nvPicPr>
+          <p:cNvPr id="4" name="Content Placeholder 3">
+            <a:extLst>
+              <a:ext uri="{FF2B5EF4-FFF2-40B4-BE49-F238E27FC236}">
+                <a16:creationId xmlns:a16="http://schemas.microsoft.com/office/drawing/2014/main" id="{D2DCE1D5-B2C7-4EB5-B9BB-5B90A0D6E4E8}"/>
+              </a:ext>
+            </a:extLst>
+          </p:cNvPr>
+          <p:cNvPicPr>
+            <a:picLocks noGrp="1" noChangeAspect="1"/>
+          </p:cNvPicPr>
+          <p:nvPr>
+            <p:ph idx="1"/>
+          </p:nvPr>
+        </p:nvPicPr>
+        <p:blipFill>
+          <a:blip r:embed="rId2"/>
+          <a:stretch>
+            <a:fillRect/>
+          </a:stretch>
+        </p:blipFill>
+        <p:spPr>
+          <a:xfrm>
+            <a:off x="838200" y="2215996"/>
+            <a:ext cx="10515600" cy="3570595"/>
+          </a:xfrm>
+          <a:prstGeom prst="rect">
+            <a:avLst/>
+          </a:prstGeom>
+        </p:spPr>
+      </p:pic>
+    </p:spTree>
+    <p:extLst>
+      <p:ext uri="{BB962C8B-B14F-4D97-AF65-F5344CB8AC3E}">
+        <p14:creationId xmlns:p14="http://schemas.microsoft.com/office/powerpoint/2010/main" val="2879139082"/>
+      </p:ext>
+    </p:extLst>
+  </p:cSld>
+  <p:clrMapOvr>
+    <a:masterClrMapping/>
+  </p:clrMapOvr>
+</p:sld>
+</file>
+
+<file path=ppt/slides/slide11.xml><?xml version="1.0" encoding="utf-8"?>
+<p:sld xmlns:a="http://schemas.openxmlformats.org/drawingml/2006/main" xmlns:r="http://schemas.openxmlformats.org/officeDocument/2006/relationships" xmlns:p="http://schemas.openxmlformats.org/presentationml/2006/main">
+  <p:cSld>
+    <p:spTree>
+      <p:nvGrpSpPr>
+        <p:cNvPr id="1" name=""/>
+        <p:cNvGrpSpPr/>
+        <p:nvPr/>
+      </p:nvGrpSpPr>
+      <p:grpSpPr>
+        <a:xfrm>
+          <a:off x="0" y="0"/>
+          <a:ext cx="0" cy="0"/>
+          <a:chOff x="0" y="0"/>
+          <a:chExt cx="0" cy="0"/>
+        </a:xfrm>
+      </p:grpSpPr>
+      <p:sp>
+        <p:nvSpPr>
+          <p:cNvPr id="2" name="Title 1">
+            <a:extLst>
+              <a:ext uri="{FF2B5EF4-FFF2-40B4-BE49-F238E27FC236}">
+                <a16:creationId xmlns:a16="http://schemas.microsoft.com/office/drawing/2014/main" id="{2887D5F0-9ADF-4396-8D0A-C674F7E53240}"/>
+              </a:ext>
+            </a:extLst>
+          </p:cNvPr>
+          <p:cNvSpPr>
+            <a:spLocks noGrp="1"/>
+          </p:cNvSpPr>
+          <p:nvPr>
+            <p:ph type="title"/>
+          </p:nvPr>
+        </p:nvSpPr>
+        <p:spPr/>
+        <p:txBody>
+          <a:bodyPr/>
+          <a:lstStyle/>
+          <a:p>
             <a:r>
               <a:rPr lang="en-US" dirty="0"/>
-              <a:t>AWS Services &amp; Ecosystem</a:t>
-            </a:r>
-          </a:p>
-        </p:txBody>
-      </p:sp>
-      <p:sp>
-        <p:nvSpPr>
-          <p:cNvPr id="3" name="Content Placeholder 2">
-            <a:extLst>
-              <a:ext uri="{FF2B5EF4-FFF2-40B4-BE49-F238E27FC236}">
-                <a16:creationId xmlns:a16="http://schemas.microsoft.com/office/drawing/2014/main" id="{B8D2876B-73A4-4791-B173-BA3B77F0BD6F}"/>
-              </a:ext>
-            </a:extLst>
-          </p:cNvPr>
-          <p:cNvSpPr>
-            <a:spLocks noGrp="1"/>
-          </p:cNvSpPr>
+              <a:t>Integrate the API gateway with lambda function - </a:t>
+            </a:r>
+            <a:r>
+              <a:rPr lang="en-US" dirty="0" err="1"/>
+              <a:t>bedrockapp</a:t>
+            </a:r>
+            <a:endParaRPr lang="en-US" dirty="0"/>
+          </a:p>
+        </p:txBody>
+      </p:sp>
+      <p:pic>
+        <p:nvPicPr>
+          <p:cNvPr id="4" name="Content Placeholder 3">
+            <a:extLst>
+              <a:ext uri="{FF2B5EF4-FFF2-40B4-BE49-F238E27FC236}">
+                <a16:creationId xmlns:a16="http://schemas.microsoft.com/office/drawing/2014/main" id="{AE415E88-6ACC-449D-8FC3-B4DB2260E2A1}"/>
+              </a:ext>
+            </a:extLst>
+          </p:cNvPr>
+          <p:cNvPicPr>
+            <a:picLocks noGrp="1" noChangeAspect="1"/>
+          </p:cNvPicPr>
           <p:nvPr>
             <p:ph idx="1"/>
           </p:nvPr>
-        </p:nvSpPr>
+        </p:nvPicPr>
+        <p:blipFill>
+          <a:blip r:embed="rId2"/>
+          <a:stretch>
+            <a:fillRect/>
+          </a:stretch>
+        </p:blipFill>
+        <p:spPr>
+          <a:xfrm>
+            <a:off x="922272" y="1816999"/>
+            <a:ext cx="9898882" cy="4351338"/>
+          </a:xfrm>
+          <a:prstGeom prst="rect">
+            <a:avLst/>
+          </a:prstGeom>
+        </p:spPr>
+      </p:pic>
+    </p:spTree>
+    <p:extLst>
+      <p:ext uri="{BB962C8B-B14F-4D97-AF65-F5344CB8AC3E}">
+        <p14:creationId xmlns:p14="http://schemas.microsoft.com/office/powerpoint/2010/main" val="418617308"/>
+      </p:ext>
+    </p:extLst>
+  </p:cSld>
+  <p:clrMapOvr>
+    <a:masterClrMapping/>
+  </p:clrMapOvr>
+</p:sld>
+</file>
+
+<file path=ppt/slides/slide12.xml><?xml version="1.0" encoding="utf-8"?>
+<p:sld xmlns:a="http://schemas.openxmlformats.org/drawingml/2006/main" xmlns:r="http://schemas.openxmlformats.org/officeDocument/2006/relationships" xmlns:p="http://schemas.openxmlformats.org/presentationml/2006/main">
+  <p:cSld>
+    <p:spTree>
+      <p:nvGrpSpPr>
+        <p:cNvPr id="1" name=""/>
+        <p:cNvGrpSpPr/>
+        <p:nvPr/>
+      </p:nvGrpSpPr>
+      <p:grpSpPr>
+        <a:xfrm>
+          <a:off x="0" y="0"/>
+          <a:ext cx="0" cy="0"/>
+          <a:chOff x="0" y="0"/>
+          <a:chExt cx="0" cy="0"/>
+        </a:xfrm>
+      </p:grpSpPr>
+      <p:sp>
+        <p:nvSpPr>
+          <p:cNvPr id="2" name="Title 1">
+            <a:extLst>
+              <a:ext uri="{FF2B5EF4-FFF2-40B4-BE49-F238E27FC236}">
+                <a16:creationId xmlns:a16="http://schemas.microsoft.com/office/drawing/2014/main" id="{62C608A6-BC7C-4DE7-9105-02F0359E8AAA}"/>
+              </a:ext>
+            </a:extLst>
+          </p:cNvPr>
+          <p:cNvSpPr>
+            <a:spLocks noGrp="1"/>
+          </p:cNvSpPr>
+          <p:nvPr>
+            <p:ph type="title"/>
+          </p:nvPr>
+        </p:nvSpPr>
+        <p:spPr/>
+        <p:txBody>
+          <a:bodyPr/>
+          <a:lstStyle/>
+          <a:p>
+            <a:endParaRPr lang="en-US"/>
+          </a:p>
+        </p:txBody>
+      </p:sp>
+      <p:pic>
+        <p:nvPicPr>
+          <p:cNvPr id="4" name="Content Placeholder 3">
+            <a:extLst>
+              <a:ext uri="{FF2B5EF4-FFF2-40B4-BE49-F238E27FC236}">
+                <a16:creationId xmlns:a16="http://schemas.microsoft.com/office/drawing/2014/main" id="{F4E43005-2C98-4DCB-9E96-50DB2C0B2D04}"/>
+              </a:ext>
+            </a:extLst>
+          </p:cNvPr>
+          <p:cNvPicPr>
+            <a:picLocks noGrp="1" noChangeAspect="1"/>
+          </p:cNvPicPr>
+          <p:nvPr>
+            <p:ph idx="1"/>
+          </p:nvPr>
+        </p:nvPicPr>
+        <p:blipFill>
+          <a:blip r:embed="rId2"/>
+          <a:stretch>
+            <a:fillRect/>
+          </a:stretch>
+        </p:blipFill>
         <p:spPr>
           <a:xfrm>
             <a:off x="838200" y="1825625"/>
-            <a:ext cx="5177649" cy="2409945"/>
-          </a:xfrm>
-        </p:spPr>
+            <a:ext cx="9786601" cy="4351338"/>
+          </a:xfrm>
+          <a:prstGeom prst="rect">
+            <a:avLst/>
+          </a:prstGeom>
+        </p:spPr>
+      </p:pic>
+    </p:spTree>
+    <p:extLst>
+      <p:ext uri="{BB962C8B-B14F-4D97-AF65-F5344CB8AC3E}">
+        <p14:creationId xmlns:p14="http://schemas.microsoft.com/office/powerpoint/2010/main" val="2943111372"/>
+      </p:ext>
+    </p:extLst>
+  </p:cSld>
+  <p:clrMapOvr>
+    <a:masterClrMapping/>
+  </p:clrMapOvr>
+</p:sld>
+</file>
+
+<file path=ppt/slides/slide13.xml><?xml version="1.0" encoding="utf-8"?>
+<p:sld xmlns:a="http://schemas.openxmlformats.org/drawingml/2006/main" xmlns:r="http://schemas.openxmlformats.org/officeDocument/2006/relationships" xmlns:p="http://schemas.openxmlformats.org/presentationml/2006/main">
+  <p:cSld>
+    <p:spTree>
+      <p:nvGrpSpPr>
+        <p:cNvPr id="1" name=""/>
+        <p:cNvGrpSpPr/>
+        <p:nvPr/>
+      </p:nvGrpSpPr>
+      <p:grpSpPr>
+        <a:xfrm>
+          <a:off x="0" y="0"/>
+          <a:ext cx="0" cy="0"/>
+          <a:chOff x="0" y="0"/>
+          <a:chExt cx="0" cy="0"/>
+        </a:xfrm>
+      </p:grpSpPr>
+      <p:sp>
+        <p:nvSpPr>
+          <p:cNvPr id="2" name="Title 1">
+            <a:extLst>
+              <a:ext uri="{FF2B5EF4-FFF2-40B4-BE49-F238E27FC236}">
+                <a16:creationId xmlns:a16="http://schemas.microsoft.com/office/drawing/2014/main" id="{DB69CDE5-8826-4B0E-8725-524BC4D6E901}"/>
+              </a:ext>
+            </a:extLst>
+          </p:cNvPr>
+          <p:cNvSpPr>
+            <a:spLocks noGrp="1"/>
+          </p:cNvSpPr>
+          <p:nvPr>
+            <p:ph type="title"/>
+          </p:nvPr>
+        </p:nvSpPr>
+        <p:spPr/>
         <p:txBody>
           <a:bodyPr/>
           <a:lstStyle/>
           <a:p>
             <a:r>
-              <a:rPr lang="en-US" sz="1400" dirty="0"/>
+              <a:rPr lang="en-US" dirty="0"/>
+              <a:t>Create DEV env in stage section and deploy</a:t>
+            </a:r>
+          </a:p>
+        </p:txBody>
+      </p:sp>
+      <p:pic>
+        <p:nvPicPr>
+          <p:cNvPr id="4" name="Content Placeholder 3">
+            <a:extLst>
+              <a:ext uri="{FF2B5EF4-FFF2-40B4-BE49-F238E27FC236}">
+                <a16:creationId xmlns:a16="http://schemas.microsoft.com/office/drawing/2014/main" id="{1EC59BC7-04D5-4502-96A7-FDA26E001893}"/>
+              </a:ext>
+            </a:extLst>
+          </p:cNvPr>
+          <p:cNvPicPr>
+            <a:picLocks noGrp="1" noChangeAspect="1"/>
+          </p:cNvPicPr>
+          <p:nvPr>
+            <p:ph idx="1"/>
+          </p:nvPr>
+        </p:nvPicPr>
+        <p:blipFill>
+          <a:blip r:embed="rId2"/>
+          <a:stretch>
+            <a:fillRect/>
+          </a:stretch>
+        </p:blipFill>
+        <p:spPr>
+          <a:xfrm>
+            <a:off x="838200" y="1316667"/>
+            <a:ext cx="7691607" cy="3393356"/>
+          </a:xfrm>
+          <a:prstGeom prst="rect">
+            <a:avLst/>
+          </a:prstGeom>
+        </p:spPr>
+      </p:pic>
+      <p:pic>
+        <p:nvPicPr>
+          <p:cNvPr id="5" name="Picture 4">
+            <a:extLst>
+              <a:ext uri="{FF2B5EF4-FFF2-40B4-BE49-F238E27FC236}">
+                <a16:creationId xmlns:a16="http://schemas.microsoft.com/office/drawing/2014/main" id="{F71529EF-BCA7-4B8C-9CC9-DF9540B9307B}"/>
+              </a:ext>
+            </a:extLst>
+          </p:cNvPr>
+          <p:cNvPicPr>
+            <a:picLocks noChangeAspect="1"/>
+          </p:cNvPicPr>
+          <p:nvPr/>
+        </p:nvPicPr>
+        <p:blipFill>
+          <a:blip r:embed="rId3"/>
+          <a:stretch>
+            <a:fillRect/>
+          </a:stretch>
+        </p:blipFill>
+        <p:spPr>
+          <a:xfrm>
+            <a:off x="838200" y="4834945"/>
+            <a:ext cx="7691607" cy="1792962"/>
+          </a:xfrm>
+          <a:prstGeom prst="rect">
+            <a:avLst/>
+          </a:prstGeom>
+        </p:spPr>
+      </p:pic>
+    </p:spTree>
+    <p:extLst>
+      <p:ext uri="{BB962C8B-B14F-4D97-AF65-F5344CB8AC3E}">
+        <p14:creationId xmlns:p14="http://schemas.microsoft.com/office/powerpoint/2010/main" val="507786438"/>
+      </p:ext>
+    </p:extLst>
+  </p:cSld>
+  <p:clrMapOvr>
+    <a:masterClrMapping/>
+  </p:clrMapOvr>
+</p:sld>
+</file>
+
+<file path=ppt/slides/slide14.xml><?xml version="1.0" encoding="utf-8"?>
+<p:sld xmlns:a="http://schemas.openxmlformats.org/drawingml/2006/main" xmlns:r="http://schemas.openxmlformats.org/officeDocument/2006/relationships" xmlns:p="http://schemas.openxmlformats.org/presentationml/2006/main">
+  <p:cSld>
+    <p:spTree>
+      <p:nvGrpSpPr>
+        <p:cNvPr id="1" name=""/>
+        <p:cNvGrpSpPr/>
+        <p:nvPr/>
+      </p:nvGrpSpPr>
+      <p:grpSpPr>
+        <a:xfrm>
+          <a:off x="0" y="0"/>
+          <a:ext cx="0" cy="0"/>
+          <a:chOff x="0" y="0"/>
+          <a:chExt cx="0" cy="0"/>
+        </a:xfrm>
+      </p:grpSpPr>
+      <p:sp>
+        <p:nvSpPr>
+          <p:cNvPr id="2" name="Title 1">
+            <a:extLst>
+              <a:ext uri="{FF2B5EF4-FFF2-40B4-BE49-F238E27FC236}">
+                <a16:creationId xmlns:a16="http://schemas.microsoft.com/office/drawing/2014/main" id="{945C7B28-2F15-439B-8DCF-256E2E06CFCD}"/>
+              </a:ext>
+            </a:extLst>
+          </p:cNvPr>
+          <p:cNvSpPr>
+            <a:spLocks noGrp="1"/>
+          </p:cNvSpPr>
+          <p:nvPr>
+            <p:ph type="title"/>
+          </p:nvPr>
+        </p:nvSpPr>
+        <p:spPr/>
+        <p:txBody>
+          <a:bodyPr/>
+          <a:lstStyle/>
+          <a:p>
+            <a:r>
+              <a:rPr lang="en-US" dirty="0"/>
+              <a:t>Step4: Create the S3 bucket .</a:t>
+            </a:r>
+          </a:p>
+        </p:txBody>
+      </p:sp>
+      <p:pic>
+        <p:nvPicPr>
+          <p:cNvPr id="4" name="Content Placeholder 3">
+            <a:extLst>
+              <a:ext uri="{FF2B5EF4-FFF2-40B4-BE49-F238E27FC236}">
+                <a16:creationId xmlns:a16="http://schemas.microsoft.com/office/drawing/2014/main" id="{3C1AF6D4-2080-472F-99B6-61CE42FE2C26}"/>
+              </a:ext>
+            </a:extLst>
+          </p:cNvPr>
+          <p:cNvPicPr>
+            <a:picLocks noGrp="1" noChangeAspect="1"/>
+          </p:cNvPicPr>
+          <p:nvPr>
+            <p:ph idx="1"/>
+          </p:nvPr>
+        </p:nvPicPr>
+        <p:blipFill>
+          <a:blip r:embed="rId2"/>
+          <a:stretch>
+            <a:fillRect/>
+          </a:stretch>
+        </p:blipFill>
+        <p:spPr>
+          <a:xfrm>
+            <a:off x="838200" y="1609965"/>
+            <a:ext cx="3380106" cy="4351338"/>
+          </a:xfrm>
+          <a:prstGeom prst="rect">
+            <a:avLst/>
+          </a:prstGeom>
+        </p:spPr>
+      </p:pic>
+      <p:pic>
+        <p:nvPicPr>
+          <p:cNvPr id="5" name="Picture 4">
+            <a:extLst>
+              <a:ext uri="{FF2B5EF4-FFF2-40B4-BE49-F238E27FC236}">
+                <a16:creationId xmlns:a16="http://schemas.microsoft.com/office/drawing/2014/main" id="{0F10B72D-EE13-4E2D-8A87-CA93FD620D35}"/>
+              </a:ext>
+            </a:extLst>
+          </p:cNvPr>
+          <p:cNvPicPr>
+            <a:picLocks noChangeAspect="1"/>
+          </p:cNvPicPr>
+          <p:nvPr/>
+        </p:nvPicPr>
+        <p:blipFill>
+          <a:blip r:embed="rId3"/>
+          <a:stretch>
+            <a:fillRect/>
+          </a:stretch>
+        </p:blipFill>
+        <p:spPr>
+          <a:xfrm>
+            <a:off x="4210381" y="1494095"/>
+            <a:ext cx="7526630" cy="3241807"/>
+          </a:xfrm>
+          <a:prstGeom prst="rect">
+            <a:avLst/>
+          </a:prstGeom>
+        </p:spPr>
+      </p:pic>
+    </p:spTree>
+    <p:extLst>
+      <p:ext uri="{BB962C8B-B14F-4D97-AF65-F5344CB8AC3E}">
+        <p14:creationId xmlns:p14="http://schemas.microsoft.com/office/powerpoint/2010/main" val="2424099275"/>
+      </p:ext>
+    </p:extLst>
+  </p:cSld>
+  <p:clrMapOvr>
+    <a:masterClrMapping/>
+  </p:clrMapOvr>
+</p:sld>
+</file>
+
+<file path=ppt/slides/slide15.xml><?xml version="1.0" encoding="utf-8"?>
+<p:sld xmlns:a="http://schemas.openxmlformats.org/drawingml/2006/main" xmlns:r="http://schemas.openxmlformats.org/officeDocument/2006/relationships" xmlns:p="http://schemas.openxmlformats.org/presentationml/2006/main">
+  <p:cSld>
+    <p:spTree>
+      <p:nvGrpSpPr>
+        <p:cNvPr id="1" name=""/>
+        <p:cNvGrpSpPr/>
+        <p:nvPr/>
+      </p:nvGrpSpPr>
+      <p:grpSpPr>
+        <a:xfrm>
+          <a:off x="0" y="0"/>
+          <a:ext cx="0" cy="0"/>
+          <a:chOff x="0" y="0"/>
+          <a:chExt cx="0" cy="0"/>
+        </a:xfrm>
+      </p:grpSpPr>
+      <p:sp>
+        <p:nvSpPr>
+          <p:cNvPr id="2" name="Title 1">
+            <a:extLst>
+              <a:ext uri="{FF2B5EF4-FFF2-40B4-BE49-F238E27FC236}">
+                <a16:creationId xmlns:a16="http://schemas.microsoft.com/office/drawing/2014/main" id="{8686B04F-A537-4458-AE99-004C139F5214}"/>
+              </a:ext>
+            </a:extLst>
+          </p:cNvPr>
+          <p:cNvSpPr>
+            <a:spLocks noGrp="1"/>
+          </p:cNvSpPr>
+          <p:nvPr>
+            <p:ph type="title"/>
+          </p:nvPr>
+        </p:nvSpPr>
+        <p:spPr/>
+        <p:txBody>
+          <a:bodyPr/>
+          <a:lstStyle/>
+          <a:p>
+            <a:r>
+              <a:rPr lang="en-US" dirty="0"/>
+              <a:t>Test the API – API </a:t>
+            </a:r>
+            <a:r>
+              <a:rPr lang="en-US" dirty="0" err="1"/>
+              <a:t>addr</a:t>
+            </a:r>
+            <a:r>
+              <a:rPr lang="en-US" dirty="0"/>
+              <a:t> from stage section</a:t>
+            </a:r>
+          </a:p>
+        </p:txBody>
+      </p:sp>
+      <p:sp>
+        <p:nvSpPr>
+          <p:cNvPr id="3" name="Content Placeholder 2">
+            <a:extLst>
+              <a:ext uri="{FF2B5EF4-FFF2-40B4-BE49-F238E27FC236}">
+                <a16:creationId xmlns:a16="http://schemas.microsoft.com/office/drawing/2014/main" id="{F736117F-4249-4BEF-A6FF-C55576CB9FDD}"/>
+              </a:ext>
+            </a:extLst>
+          </p:cNvPr>
+          <p:cNvSpPr>
+            <a:spLocks noGrp="1"/>
+          </p:cNvSpPr>
+          <p:nvPr>
+            <p:ph idx="1"/>
+          </p:nvPr>
+        </p:nvSpPr>
+        <p:spPr/>
+        <p:txBody>
+          <a:bodyPr/>
+          <a:lstStyle/>
+          <a:p>
+            <a:r>
+              <a:rPr lang="en-US" dirty="0">
+                <a:hlinkClick r:id="rId2"/>
+              </a:rPr>
+              <a:t>https://iuyhoai8xc.execute-api.us-east-1.amazonaws.com/dev</a:t>
+            </a:r>
+            <a:endParaRPr lang="en-US" dirty="0"/>
+          </a:p>
+          <a:p>
+            <a:endParaRPr lang="en-US" dirty="0"/>
+          </a:p>
+        </p:txBody>
+      </p:sp>
+      <p:pic>
+        <p:nvPicPr>
+          <p:cNvPr id="4" name="Picture 3">
+            <a:extLst>
+              <a:ext uri="{FF2B5EF4-FFF2-40B4-BE49-F238E27FC236}">
+                <a16:creationId xmlns:a16="http://schemas.microsoft.com/office/drawing/2014/main" id="{9B9B4431-BB75-4A12-8A97-56447848FE72}"/>
+              </a:ext>
+            </a:extLst>
+          </p:cNvPr>
+          <p:cNvPicPr>
+            <a:picLocks noChangeAspect="1"/>
+          </p:cNvPicPr>
+          <p:nvPr/>
+        </p:nvPicPr>
+        <p:blipFill>
+          <a:blip r:embed="rId3"/>
+          <a:stretch>
+            <a:fillRect/>
+          </a:stretch>
+        </p:blipFill>
+        <p:spPr>
+          <a:xfrm>
+            <a:off x="769189" y="2421028"/>
+            <a:ext cx="4958751" cy="2983721"/>
+          </a:xfrm>
+          <a:prstGeom prst="rect">
+            <a:avLst/>
+          </a:prstGeom>
+        </p:spPr>
+      </p:pic>
+      <p:pic>
+        <p:nvPicPr>
+          <p:cNvPr id="5" name="Picture 4">
+            <a:extLst>
+              <a:ext uri="{FF2B5EF4-FFF2-40B4-BE49-F238E27FC236}">
+                <a16:creationId xmlns:a16="http://schemas.microsoft.com/office/drawing/2014/main" id="{1AD73CBC-0FAB-4D4E-9221-FA12C4D02DB7}"/>
+              </a:ext>
+            </a:extLst>
+          </p:cNvPr>
+          <p:cNvPicPr>
+            <a:picLocks noChangeAspect="1"/>
+          </p:cNvPicPr>
+          <p:nvPr/>
+        </p:nvPicPr>
+        <p:blipFill>
+          <a:blip r:embed="rId4"/>
+          <a:stretch>
+            <a:fillRect/>
+          </a:stretch>
+        </p:blipFill>
+        <p:spPr>
+          <a:xfrm>
+            <a:off x="4623183" y="3727324"/>
+            <a:ext cx="7055635" cy="2497384"/>
+          </a:xfrm>
+          <a:prstGeom prst="rect">
+            <a:avLst/>
+          </a:prstGeom>
+        </p:spPr>
+      </p:pic>
+    </p:spTree>
+    <p:extLst>
+      <p:ext uri="{BB962C8B-B14F-4D97-AF65-F5344CB8AC3E}">
+        <p14:creationId xmlns:p14="http://schemas.microsoft.com/office/powerpoint/2010/main" val="2109351083"/>
+      </p:ext>
+    </p:extLst>
+  </p:cSld>
+  <p:clrMapOvr>
+    <a:masterClrMapping/>
+  </p:clrMapOvr>
+</p:sld>
+</file>
+
+<file path=ppt/slides/slide16.xml><?xml version="1.0" encoding="utf-8"?>
+<p:sld xmlns:a="http://schemas.openxmlformats.org/drawingml/2006/main" xmlns:r="http://schemas.openxmlformats.org/officeDocument/2006/relationships" xmlns:p="http://schemas.openxmlformats.org/presentationml/2006/main">
+  <p:cSld>
+    <p:spTree>
+      <p:nvGrpSpPr>
+        <p:cNvPr id="1" name=""/>
+        <p:cNvGrpSpPr/>
+        <p:nvPr/>
+      </p:nvGrpSpPr>
+      <p:grpSpPr>
+        <a:xfrm>
+          <a:off x="0" y="0"/>
+          <a:ext cx="0" cy="0"/>
+          <a:chOff x="0" y="0"/>
+          <a:chExt cx="0" cy="0"/>
+        </a:xfrm>
+      </p:grpSpPr>
+      <p:sp>
+        <p:nvSpPr>
+          <p:cNvPr id="2" name="Title 1">
+            <a:extLst>
+              <a:ext uri="{FF2B5EF4-FFF2-40B4-BE49-F238E27FC236}">
+                <a16:creationId xmlns:a16="http://schemas.microsoft.com/office/drawing/2014/main" id="{F8057108-11C2-4618-B98A-6648FED0E6DA}"/>
+              </a:ext>
+            </a:extLst>
+          </p:cNvPr>
+          <p:cNvSpPr>
+            <a:spLocks noGrp="1"/>
+          </p:cNvSpPr>
+          <p:nvPr>
+            <p:ph type="title"/>
+          </p:nvPr>
+        </p:nvSpPr>
+        <p:spPr/>
+        <p:txBody>
+          <a:bodyPr/>
+          <a:lstStyle/>
+          <a:p>
+            <a:r>
+              <a:rPr lang="en-US" dirty="0"/>
+              <a:t>Check the roles and permissions</a:t>
+            </a:r>
+          </a:p>
+        </p:txBody>
+      </p:sp>
+      <p:pic>
+        <p:nvPicPr>
+          <p:cNvPr id="4" name="Content Placeholder 3">
+            <a:extLst>
+              <a:ext uri="{FF2B5EF4-FFF2-40B4-BE49-F238E27FC236}">
+                <a16:creationId xmlns:a16="http://schemas.microsoft.com/office/drawing/2014/main" id="{660EF848-0A14-4A99-B1C4-69082C2FBCBD}"/>
+              </a:ext>
+            </a:extLst>
+          </p:cNvPr>
+          <p:cNvPicPr>
+            <a:picLocks noGrp="1" noChangeAspect="1"/>
+          </p:cNvPicPr>
+          <p:nvPr>
+            <p:ph idx="1"/>
+          </p:nvPr>
+        </p:nvPicPr>
+        <p:blipFill>
+          <a:blip r:embed="rId2"/>
+          <a:stretch>
+            <a:fillRect/>
+          </a:stretch>
+        </p:blipFill>
+        <p:spPr>
+          <a:xfrm>
+            <a:off x="915384" y="1575459"/>
+            <a:ext cx="3924035" cy="2914662"/>
+          </a:xfrm>
+          <a:prstGeom prst="rect">
+            <a:avLst/>
+          </a:prstGeom>
+        </p:spPr>
+      </p:pic>
+    </p:spTree>
+    <p:extLst>
+      <p:ext uri="{BB962C8B-B14F-4D97-AF65-F5344CB8AC3E}">
+        <p14:creationId xmlns:p14="http://schemas.microsoft.com/office/powerpoint/2010/main" val="3022186009"/>
+      </p:ext>
+    </p:extLst>
+  </p:cSld>
+  <p:clrMapOvr>
+    <a:masterClrMapping/>
+  </p:clrMapOvr>
+</p:sld>
+</file>
+
+<file path=ppt/slides/slide2.xml><?xml version="1.0" encoding="utf-8"?>
+<p:sld xmlns:a="http://schemas.openxmlformats.org/drawingml/2006/main" xmlns:r="http://schemas.openxmlformats.org/officeDocument/2006/relationships" xmlns:p="http://schemas.openxmlformats.org/presentationml/2006/main">
+  <p:cSld>
+    <p:bg>
+      <p:bgPr>
+        <a:solidFill>
+          <a:schemeClr val="tx1"/>
+        </a:solidFill>
+        <a:effectLst/>
+      </p:bgPr>
+    </p:bg>
+    <p:spTree>
+      <p:nvGrpSpPr>
+        <p:cNvPr id="1" name=""/>
+        <p:cNvGrpSpPr/>
+        <p:nvPr/>
+      </p:nvGrpSpPr>
+      <p:grpSpPr>
+        <a:xfrm>
+          <a:off x="0" y="0"/>
+          <a:ext cx="0" cy="0"/>
+          <a:chOff x="0" y="0"/>
+          <a:chExt cx="0" cy="0"/>
+        </a:xfrm>
+      </p:grpSpPr>
+      <p:sp>
+        <p:nvSpPr>
+          <p:cNvPr id="2" name="Title 1">
+            <a:extLst>
+              <a:ext uri="{FF2B5EF4-FFF2-40B4-BE49-F238E27FC236}">
+                <a16:creationId xmlns:a16="http://schemas.microsoft.com/office/drawing/2014/main" id="{855044C0-680E-48E7-99E1-AC059F74A5E5}"/>
+              </a:ext>
+            </a:extLst>
+          </p:cNvPr>
+          <p:cNvSpPr>
+            <a:spLocks noGrp="1"/>
+          </p:cNvSpPr>
+          <p:nvPr>
+            <p:ph type="title"/>
+          </p:nvPr>
+        </p:nvSpPr>
+        <p:spPr/>
+        <p:txBody>
+          <a:bodyPr/>
+          <a:lstStyle/>
+          <a:p>
+            <a:r>
+              <a:rPr lang="en-US" dirty="0">
+                <a:solidFill>
+                  <a:schemeClr val="bg1"/>
+                </a:solidFill>
+              </a:rPr>
+              <a:t>AWS Services &amp; Ecosystem</a:t>
+            </a:r>
+          </a:p>
+        </p:txBody>
+      </p:sp>
+      <p:sp>
+        <p:nvSpPr>
+          <p:cNvPr id="3" name="Content Placeholder 2">
+            <a:extLst>
+              <a:ext uri="{FF2B5EF4-FFF2-40B4-BE49-F238E27FC236}">
+                <a16:creationId xmlns:a16="http://schemas.microsoft.com/office/drawing/2014/main" id="{B8D2876B-73A4-4791-B173-BA3B77F0BD6F}"/>
+              </a:ext>
+            </a:extLst>
+          </p:cNvPr>
+          <p:cNvSpPr>
+            <a:spLocks noGrp="1"/>
+          </p:cNvSpPr>
+          <p:nvPr>
+            <p:ph idx="1"/>
+          </p:nvPr>
+        </p:nvSpPr>
+        <p:spPr>
+          <a:xfrm>
+            <a:off x="838201" y="1825626"/>
+            <a:ext cx="3295336" cy="1958196"/>
+          </a:xfrm>
+        </p:spPr>
+        <p:txBody>
+          <a:bodyPr/>
+          <a:lstStyle/>
+          <a:p>
+            <a:r>
+              <a:rPr lang="en-US" sz="1400" dirty="0">
+                <a:solidFill>
+                  <a:schemeClr val="bg1"/>
+                </a:solidFill>
+              </a:rPr>
               <a:t>AWS </a:t>
             </a:r>
             <a:r>
-              <a:rPr lang="en-US" sz="1400" dirty="0" err="1"/>
+              <a:rPr lang="en-US" sz="1400" dirty="0" err="1">
+                <a:solidFill>
+                  <a:schemeClr val="bg1"/>
+                </a:solidFill>
+              </a:rPr>
               <a:t>BedRock</a:t>
             </a:r>
-            <a:endParaRPr lang="en-US" sz="1400" dirty="0"/>
-          </a:p>
-          <a:p>
-            <a:r>
-              <a:rPr lang="en-US" sz="1400" dirty="0"/>
+            <a:endParaRPr lang="en-US" sz="1400" dirty="0">
+              <a:solidFill>
+                <a:schemeClr val="bg1"/>
+              </a:solidFill>
+            </a:endParaRPr>
+          </a:p>
+          <a:p>
+            <a:r>
+              <a:rPr lang="en-US" sz="1400" dirty="0">
+                <a:solidFill>
+                  <a:schemeClr val="bg1"/>
+                </a:solidFill>
+              </a:rPr>
               <a:t>API Gateway</a:t>
             </a:r>
           </a:p>
           <a:p>
             <a:r>
-              <a:rPr lang="en-US" sz="1400" dirty="0"/>
+              <a:rPr lang="en-US" sz="1400" dirty="0">
+                <a:solidFill>
+                  <a:schemeClr val="bg1"/>
+                </a:solidFill>
+              </a:rPr>
               <a:t>Lambda Function </a:t>
             </a:r>
           </a:p>
           <a:p>
             <a:r>
-              <a:rPr lang="en-US" sz="1400" dirty="0"/>
+              <a:rPr lang="en-US" sz="1400" dirty="0">
+                <a:solidFill>
+                  <a:schemeClr val="bg1"/>
+                </a:solidFill>
+              </a:rPr>
               <a:t>Cloud Watch</a:t>
             </a:r>
           </a:p>
           <a:p>
             <a:r>
-              <a:rPr lang="en-US" sz="1400" dirty="0"/>
+              <a:rPr lang="en-US" sz="1400" dirty="0">
+                <a:solidFill>
+                  <a:schemeClr val="bg1"/>
+                </a:solidFill>
+              </a:rPr>
               <a:t>AWS </a:t>
             </a:r>
             <a:r>
-              <a:rPr lang="en-US" sz="1400" dirty="0" err="1"/>
+              <a:rPr lang="en-US" sz="1400" dirty="0" err="1">
+                <a:solidFill>
+                  <a:schemeClr val="bg1"/>
+                </a:solidFill>
+              </a:rPr>
               <a:t>Sagemaker</a:t>
             </a:r>
-            <a:endParaRPr lang="en-US" sz="1400" dirty="0"/>
-          </a:p>
-          <a:p>
-            <a:r>
-              <a:rPr lang="en-US" sz="1400" dirty="0"/>
+            <a:endParaRPr lang="en-US" sz="1400" dirty="0">
+              <a:solidFill>
+                <a:schemeClr val="bg1"/>
+              </a:solidFill>
+            </a:endParaRPr>
+          </a:p>
+          <a:p>
+            <a:r>
+              <a:rPr lang="en-US" sz="1400" dirty="0">
+                <a:solidFill>
+                  <a:schemeClr val="bg1"/>
+                </a:solidFill>
+              </a:rPr>
               <a:t>S3 Bucket</a:t>
             </a:r>
           </a:p>
@@ -3553,14 +4382,26 @@
           <a:p>
             <a:pPr algn="ctr"/>
             <a:r>
-              <a:rPr lang="en-US" sz="1400" b="1" u="sng" dirty="0"/>
+              <a:rPr lang="en-US" sz="1400" b="1" u="sng" dirty="0">
+                <a:solidFill>
+                  <a:schemeClr val="bg1"/>
+                </a:solidFill>
+              </a:rPr>
               <a:t>NLP </a:t>
             </a:r>
             <a:r>
-              <a:rPr lang="en-US" sz="1400" b="1" u="sng" dirty="0" err="1"/>
+              <a:rPr lang="en-US" sz="1400" b="1" u="sng" dirty="0" err="1">
+                <a:solidFill>
+                  <a:schemeClr val="bg1"/>
+                </a:solidFill>
+              </a:rPr>
               <a:t>Usecases</a:t>
             </a:r>
-            <a:endParaRPr lang="en-US" sz="1400" b="1" u="sng" dirty="0"/>
+            <a:endParaRPr lang="en-US" sz="1400" b="1" u="sng" dirty="0">
+              <a:solidFill>
+                <a:schemeClr val="bg1"/>
+              </a:solidFill>
+            </a:endParaRPr>
           </a:p>
           <a:p>
             <a:pPr marL="285750" indent="-285750">
@@ -3568,7 +4409,11 @@
               <a:buChar char="•"/>
             </a:pPr>
             <a:r>
-              <a:rPr lang="en-US" sz="1400" dirty="0"/>
+              <a:rPr lang="en-US" sz="1400" dirty="0">
+                <a:solidFill>
+                  <a:schemeClr val="bg1"/>
+                </a:solidFill>
+              </a:rPr>
               <a:t>Chat</a:t>
             </a:r>
           </a:p>
@@ -3578,7 +4423,11 @@
               <a:buChar char="•"/>
             </a:pPr>
             <a:r>
-              <a:rPr lang="en-US" sz="1400" dirty="0"/>
+              <a:rPr lang="en-US" sz="1400" dirty="0">
+                <a:solidFill>
+                  <a:schemeClr val="bg1"/>
+                </a:solidFill>
+              </a:rPr>
               <a:t>Query</a:t>
             </a:r>
           </a:p>
@@ -3588,7 +4437,11 @@
               <a:buChar char="•"/>
             </a:pPr>
             <a:r>
-              <a:rPr lang="en-US" sz="1400" dirty="0"/>
+              <a:rPr lang="en-US" sz="1400" dirty="0">
+                <a:solidFill>
+                  <a:schemeClr val="bg1"/>
+                </a:solidFill>
+              </a:rPr>
               <a:t>summarizer</a:t>
             </a:r>
           </a:p>
@@ -3598,7 +4451,11 @@
               <a:buChar char="•"/>
             </a:pPr>
             <a:r>
-              <a:rPr lang="en-US" sz="1400" dirty="0"/>
+              <a:rPr lang="en-US" sz="1400" dirty="0">
+                <a:solidFill>
+                  <a:schemeClr val="bg1"/>
+                </a:solidFill>
+              </a:rPr>
               <a:t>writer</a:t>
             </a:r>
           </a:p>
@@ -3647,7 +4504,11 @@
           <a:p>
             <a:pPr algn="ctr"/>
             <a:r>
-              <a:rPr lang="en-US" sz="1400" dirty="0"/>
+              <a:rPr lang="en-US" sz="1400" dirty="0">
+                <a:solidFill>
+                  <a:schemeClr val="bg1"/>
+                </a:solidFill>
+              </a:rPr>
               <a:t>Client</a:t>
             </a:r>
           </a:p>
@@ -3696,7 +4557,11 @@
           <a:p>
             <a:pPr algn="ctr"/>
             <a:r>
-              <a:rPr lang="en-US" sz="1400" dirty="0"/>
+              <a:rPr lang="en-US" sz="1400" dirty="0">
+                <a:solidFill>
+                  <a:schemeClr val="bg1"/>
+                </a:solidFill>
+              </a:rPr>
               <a:t>API Gateway</a:t>
             </a:r>
           </a:p>
@@ -3751,14 +4616,22 @@
           <a:p>
             <a:pPr algn="ctr"/>
             <a:r>
-              <a:rPr lang="en-US" sz="1400" dirty="0"/>
+              <a:rPr lang="en-US" sz="1400" dirty="0">
+                <a:solidFill>
+                  <a:schemeClr val="bg1"/>
+                </a:solidFill>
+              </a:rPr>
               <a:t>Lambda Function</a:t>
             </a:r>
           </a:p>
           <a:p>
             <a:pPr algn="ctr"/>
             <a:r>
-              <a:rPr lang="en-US" sz="1400" dirty="0"/>
+              <a:rPr lang="en-US" sz="1400" dirty="0">
+                <a:solidFill>
+                  <a:schemeClr val="bg1"/>
+                </a:solidFill>
+              </a:rPr>
               <a:t>(pkg)</a:t>
             </a:r>
           </a:p>
@@ -3812,14 +4685,26 @@
           <a:p>
             <a:pPr algn="ctr"/>
             <a:r>
-              <a:rPr lang="en-US" sz="1400" dirty="0"/>
+              <a:rPr lang="en-US" sz="1400" dirty="0">
+                <a:solidFill>
+                  <a:schemeClr val="bg1"/>
+                </a:solidFill>
+              </a:rPr>
               <a:t>AWS </a:t>
             </a:r>
             <a:r>
-              <a:rPr lang="en-US" sz="1400" dirty="0" err="1"/>
+              <a:rPr lang="en-US" sz="1400" dirty="0" err="1">
+                <a:solidFill>
+                  <a:schemeClr val="bg1"/>
+                </a:solidFill>
+              </a:rPr>
               <a:t>BedRock</a:t>
             </a:r>
-            <a:endParaRPr lang="en-US" sz="1400" dirty="0"/>
+            <a:endParaRPr lang="en-US" sz="1400" dirty="0">
+              <a:solidFill>
+                <a:schemeClr val="bg1"/>
+              </a:solidFill>
+            </a:endParaRPr>
           </a:p>
         </p:txBody>
       </p:sp>
@@ -3866,7 +4751,11 @@
           <a:p>
             <a:pPr algn="ctr"/>
             <a:r>
-              <a:rPr lang="en-US" sz="1400" dirty="0"/>
+              <a:rPr lang="en-US" sz="1400" dirty="0">
+                <a:solidFill>
+                  <a:schemeClr val="bg1"/>
+                </a:solidFill>
+              </a:rPr>
               <a:t>Other integrations</a:t>
             </a:r>
           </a:p>
@@ -4130,7 +5019,11 @@
           <a:lstStyle/>
           <a:p>
             <a:pPr algn="ctr"/>
-            <a:endParaRPr lang="en-US" sz="1400"/>
+            <a:endParaRPr lang="en-US" sz="1400">
+              <a:solidFill>
+                <a:schemeClr val="bg1"/>
+              </a:solidFill>
+            </a:endParaRPr>
           </a:p>
         </p:txBody>
       </p:sp>
@@ -4163,7 +5056,11 @@
           <a:lstStyle/>
           <a:p>
             <a:r>
-              <a:rPr lang="en-US" sz="1000" dirty="0"/>
+              <a:rPr lang="en-US" sz="1000" dirty="0">
+                <a:solidFill>
+                  <a:schemeClr val="bg1"/>
+                </a:solidFill>
+              </a:rPr>
               <a:t>Foundation Models</a:t>
             </a:r>
           </a:p>
@@ -4212,7 +5109,11 @@
           <a:lstStyle/>
           <a:p>
             <a:pPr algn="ctr"/>
-            <a:endParaRPr lang="en-US" sz="1400" dirty="0"/>
+            <a:endParaRPr lang="en-US" sz="1400" dirty="0">
+              <a:solidFill>
+                <a:schemeClr val="bg1"/>
+              </a:solidFill>
+            </a:endParaRPr>
           </a:p>
         </p:txBody>
       </p:sp>
@@ -4245,7 +5146,11 @@
           <a:lstStyle/>
           <a:p>
             <a:r>
-              <a:rPr lang="en-US" sz="1000" dirty="0"/>
+              <a:rPr lang="en-US" sz="1000" dirty="0">
+                <a:solidFill>
+                  <a:schemeClr val="bg1"/>
+                </a:solidFill>
+              </a:rPr>
               <a:t>Finetuning Pipeline</a:t>
             </a:r>
           </a:p>
@@ -4297,22 +5202,38 @@
           <a:p>
             <a:pPr algn="ctr"/>
             <a:r>
-              <a:rPr lang="en-US" sz="1400" dirty="0"/>
+              <a:rPr lang="en-US" sz="1400" dirty="0">
+                <a:solidFill>
+                  <a:schemeClr val="bg1"/>
+                </a:solidFill>
+              </a:rPr>
               <a:t>AWS</a:t>
             </a:r>
           </a:p>
           <a:p>
             <a:pPr algn="ctr"/>
             <a:r>
-              <a:rPr lang="en-US" sz="1400" dirty="0" err="1"/>
+              <a:rPr lang="en-US" sz="1400" dirty="0" err="1">
+                <a:solidFill>
+                  <a:schemeClr val="bg1"/>
+                </a:solidFill>
+              </a:rPr>
               <a:t>Sagemaker</a:t>
             </a:r>
-            <a:endParaRPr lang="en-US" sz="1400" dirty="0"/>
+            <a:endParaRPr lang="en-US" sz="1400" dirty="0">
+              <a:solidFill>
+                <a:schemeClr val="bg1"/>
+              </a:solidFill>
+            </a:endParaRPr>
           </a:p>
           <a:p>
             <a:pPr algn="ctr"/>
             <a:r>
-              <a:rPr lang="en-US" sz="1400" dirty="0"/>
+              <a:rPr lang="en-US" sz="1400" dirty="0">
+                <a:solidFill>
+                  <a:schemeClr val="bg1"/>
+                </a:solidFill>
+              </a:rPr>
               <a:t>(deploy)</a:t>
             </a:r>
           </a:p>
@@ -4407,7 +5328,11 @@
           <a:p>
             <a:pPr algn="ctr"/>
             <a:r>
-              <a:rPr lang="en-US" dirty="0"/>
+              <a:rPr lang="en-US" dirty="0">
+                <a:solidFill>
+                  <a:schemeClr val="bg1"/>
+                </a:solidFill>
+              </a:rPr>
               <a:t>S3</a:t>
             </a:r>
           </a:p>
@@ -4433,6 +5358,92 @@
           <a:xfrm rot="16200000" flipH="1">
             <a:off x="6097684" y="3782638"/>
             <a:ext cx="1327080" cy="705752"/>
+          </a:xfrm>
+          <a:prstGeom prst="bentConnector3">
+            <a:avLst>
+              <a:gd name="adj1" fmla="val 50000"/>
+            </a:avLst>
+          </a:prstGeom>
+          <a:ln>
+            <a:tailEnd type="triangle"/>
+          </a:ln>
+        </p:spPr>
+        <p:style>
+          <a:lnRef idx="3">
+            <a:schemeClr val="accent1"/>
+          </a:lnRef>
+          <a:fillRef idx="0">
+            <a:schemeClr val="accent1"/>
+          </a:fillRef>
+          <a:effectRef idx="2">
+            <a:schemeClr val="accent1"/>
+          </a:effectRef>
+          <a:fontRef idx="minor">
+            <a:schemeClr val="tx1"/>
+          </a:fontRef>
+        </p:style>
+      </p:cxnSp>
+      <p:cxnSp>
+        <p:nvCxnSpPr>
+          <p:cNvPr id="23" name="Connector: Elbow 22">
+            <a:extLst>
+              <a:ext uri="{FF2B5EF4-FFF2-40B4-BE49-F238E27FC236}">
+                <a16:creationId xmlns:a16="http://schemas.microsoft.com/office/drawing/2014/main" id="{40F55BCE-C78F-4195-BF48-DA074B078233}"/>
+              </a:ext>
+            </a:extLst>
+          </p:cNvPr>
+          <p:cNvCxnSpPr>
+            <a:cxnSpLocks/>
+          </p:cNvCxnSpPr>
+          <p:nvPr/>
+        </p:nvCxnSpPr>
+        <p:spPr>
+          <a:xfrm rot="10800000" flipV="1">
+            <a:off x="4342321" y="5201729"/>
+            <a:ext cx="370938" cy="1"/>
+          </a:xfrm>
+          <a:prstGeom prst="bentConnector3">
+            <a:avLst>
+              <a:gd name="adj1" fmla="val 50000"/>
+            </a:avLst>
+          </a:prstGeom>
+          <a:ln>
+            <a:tailEnd type="triangle"/>
+          </a:ln>
+        </p:spPr>
+        <p:style>
+          <a:lnRef idx="3">
+            <a:schemeClr val="accent1"/>
+          </a:lnRef>
+          <a:fillRef idx="0">
+            <a:schemeClr val="accent1"/>
+          </a:fillRef>
+          <a:effectRef idx="2">
+            <a:schemeClr val="accent1"/>
+          </a:effectRef>
+          <a:fontRef idx="minor">
+            <a:schemeClr val="tx1"/>
+          </a:fontRef>
+        </p:style>
+      </p:cxnSp>
+      <p:cxnSp>
+        <p:nvCxnSpPr>
+          <p:cNvPr id="31" name="Connector: Elbow 30">
+            <a:extLst>
+              <a:ext uri="{FF2B5EF4-FFF2-40B4-BE49-F238E27FC236}">
+                <a16:creationId xmlns:a16="http://schemas.microsoft.com/office/drawing/2014/main" id="{9CE4DACA-4207-4D73-86FB-BAACA8F1AE02}"/>
+              </a:ext>
+            </a:extLst>
+          </p:cNvPr>
+          <p:cNvCxnSpPr>
+            <a:cxnSpLocks/>
+          </p:cNvCxnSpPr>
+          <p:nvPr/>
+        </p:nvCxnSpPr>
+        <p:spPr>
+          <a:xfrm rot="10800000" flipV="1">
+            <a:off x="6008567" y="5201729"/>
+            <a:ext cx="370938" cy="1"/>
           </a:xfrm>
           <a:prstGeom prst="bentConnector3">
             <a:avLst>
@@ -4493,6 +5504,130 @@
           <p:cNvPr id="2" name="Title 1">
             <a:extLst>
               <a:ext uri="{FF2B5EF4-FFF2-40B4-BE49-F238E27FC236}">
+                <a16:creationId xmlns:a16="http://schemas.microsoft.com/office/drawing/2014/main" id="{9B8768A8-7251-4F5F-8508-FCA02CECFFD6}"/>
+              </a:ext>
+            </a:extLst>
+          </p:cNvPr>
+          <p:cNvSpPr>
+            <a:spLocks noGrp="1"/>
+          </p:cNvSpPr>
+          <p:nvPr>
+            <p:ph type="title"/>
+          </p:nvPr>
+        </p:nvSpPr>
+        <p:spPr/>
+        <p:txBody>
+          <a:bodyPr/>
+          <a:lstStyle/>
+          <a:p>
+            <a:r>
+              <a:rPr lang="en-US" dirty="0"/>
+              <a:t>Get Model access</a:t>
+            </a:r>
+          </a:p>
+        </p:txBody>
+      </p:sp>
+      <p:pic>
+        <p:nvPicPr>
+          <p:cNvPr id="4" name="Content Placeholder 3">
+            <a:extLst>
+              <a:ext uri="{FF2B5EF4-FFF2-40B4-BE49-F238E27FC236}">
+                <a16:creationId xmlns:a16="http://schemas.microsoft.com/office/drawing/2014/main" id="{447551B9-E9AC-4AFF-8EF8-E8F8134B6F9F}"/>
+              </a:ext>
+            </a:extLst>
+          </p:cNvPr>
+          <p:cNvPicPr>
+            <a:picLocks noGrp="1" noChangeAspect="1"/>
+          </p:cNvPicPr>
+          <p:nvPr>
+            <p:ph idx="1"/>
+          </p:nvPr>
+        </p:nvPicPr>
+        <p:blipFill>
+          <a:blip r:embed="rId2"/>
+          <a:stretch>
+            <a:fillRect/>
+          </a:stretch>
+        </p:blipFill>
+        <p:spPr>
+          <a:xfrm>
+            <a:off x="941717" y="1465251"/>
+            <a:ext cx="9270266" cy="3927498"/>
+          </a:xfrm>
+          <a:prstGeom prst="rect">
+            <a:avLst/>
+          </a:prstGeom>
+        </p:spPr>
+      </p:pic>
+      <p:sp>
+        <p:nvSpPr>
+          <p:cNvPr id="5" name="Rectangle 4">
+            <a:extLst>
+              <a:ext uri="{FF2B5EF4-FFF2-40B4-BE49-F238E27FC236}">
+                <a16:creationId xmlns:a16="http://schemas.microsoft.com/office/drawing/2014/main" id="{0F7BDEFF-5660-4DA6-B600-900A00B6EDE6}"/>
+              </a:ext>
+            </a:extLst>
+          </p:cNvPr>
+          <p:cNvSpPr/>
+          <p:nvPr/>
+        </p:nvSpPr>
+        <p:spPr>
+          <a:xfrm>
+            <a:off x="941717" y="5569545"/>
+            <a:ext cx="9270266" cy="646331"/>
+          </a:xfrm>
+          <a:prstGeom prst="rect">
+            <a:avLst/>
+          </a:prstGeom>
+        </p:spPr>
+        <p:txBody>
+          <a:bodyPr wrap="square">
+            <a:spAutoFit/>
+          </a:bodyPr>
+          <a:lstStyle/>
+          <a:p>
+            <a:r>
+              <a:rPr lang="en-US" dirty="0"/>
+              <a:t>https://us-east-1.console.aws.amazon.com/bedrock/home?region=us-east-1#/model-catalog/serverless/meta.llama3-2-3b-instruct-v1:0</a:t>
+            </a:r>
+          </a:p>
+        </p:txBody>
+      </p:sp>
+    </p:spTree>
+    <p:extLst>
+      <p:ext uri="{BB962C8B-B14F-4D97-AF65-F5344CB8AC3E}">
+        <p14:creationId xmlns:p14="http://schemas.microsoft.com/office/powerpoint/2010/main" val="1461934075"/>
+      </p:ext>
+    </p:extLst>
+  </p:cSld>
+  <p:clrMapOvr>
+    <a:masterClrMapping/>
+  </p:clrMapOvr>
+</p:sld>
+</file>
+
+<file path=ppt/slides/slide4.xml><?xml version="1.0" encoding="utf-8"?>
+<p:sld xmlns:a="http://schemas.openxmlformats.org/drawingml/2006/main" xmlns:r="http://schemas.openxmlformats.org/officeDocument/2006/relationships" xmlns:p="http://schemas.openxmlformats.org/presentationml/2006/main">
+  <p:cSld>
+    <p:spTree>
+      <p:nvGrpSpPr>
+        <p:cNvPr id="1" name=""/>
+        <p:cNvGrpSpPr/>
+        <p:nvPr/>
+      </p:nvGrpSpPr>
+      <p:grpSpPr>
+        <a:xfrm>
+          <a:off x="0" y="0"/>
+          <a:ext cx="0" cy="0"/>
+          <a:chOff x="0" y="0"/>
+          <a:chExt cx="0" cy="0"/>
+        </a:xfrm>
+      </p:grpSpPr>
+      <p:sp>
+        <p:nvSpPr>
+          <p:cNvPr id="2" name="Title 1">
+            <a:extLst>
+              <a:ext uri="{FF2B5EF4-FFF2-40B4-BE49-F238E27FC236}">
                 <a16:creationId xmlns:a16="http://schemas.microsoft.com/office/drawing/2014/main" id="{B1709711-A300-4482-B46A-13DF006DF9CC}"/>
               </a:ext>
             </a:extLst>
@@ -4509,7 +5644,10 @@
           <a:bodyPr/>
           <a:lstStyle/>
           <a:p>
-            <a:endParaRPr lang="en-US"/>
+            <a:r>
+              <a:rPr lang="en-US" dirty="0"/>
+              <a:t>Step1: Create Lambda function.</a:t>
+            </a:r>
           </a:p>
         </p:txBody>
       </p:sp>
@@ -4534,14 +5672,754 @@
           <a:bodyPr/>
           <a:lstStyle/>
           <a:p>
-            <a:endParaRPr lang="en-US"/>
-          </a:p>
-        </p:txBody>
-      </p:sp>
+            <a:pPr marL="0" indent="0">
+              <a:buNone/>
+            </a:pPr>
+            <a:endParaRPr lang="en-US" dirty="0"/>
+          </a:p>
+        </p:txBody>
+      </p:sp>
+      <p:pic>
+        <p:nvPicPr>
+          <p:cNvPr id="4" name="Picture 3">
+            <a:extLst>
+              <a:ext uri="{FF2B5EF4-FFF2-40B4-BE49-F238E27FC236}">
+                <a16:creationId xmlns:a16="http://schemas.microsoft.com/office/drawing/2014/main" id="{87246FB9-FF63-4043-A754-BCD1A26E16F5}"/>
+              </a:ext>
+            </a:extLst>
+          </p:cNvPr>
+          <p:cNvPicPr>
+            <a:picLocks noChangeAspect="1"/>
+          </p:cNvPicPr>
+          <p:nvPr/>
+        </p:nvPicPr>
+        <p:blipFill>
+          <a:blip r:embed="rId2"/>
+          <a:stretch>
+            <a:fillRect/>
+          </a:stretch>
+        </p:blipFill>
+        <p:spPr>
+          <a:xfrm>
+            <a:off x="838200" y="2468970"/>
+            <a:ext cx="4872487" cy="1767825"/>
+          </a:xfrm>
+          <a:prstGeom prst="rect">
+            <a:avLst/>
+          </a:prstGeom>
+        </p:spPr>
+      </p:pic>
+      <p:pic>
+        <p:nvPicPr>
+          <p:cNvPr id="5" name="Picture 4">
+            <a:extLst>
+              <a:ext uri="{FF2B5EF4-FFF2-40B4-BE49-F238E27FC236}">
+                <a16:creationId xmlns:a16="http://schemas.microsoft.com/office/drawing/2014/main" id="{8770CEF6-98ED-4311-814A-770EF5824634}"/>
+              </a:ext>
+            </a:extLst>
+          </p:cNvPr>
+          <p:cNvPicPr>
+            <a:picLocks noChangeAspect="1"/>
+          </p:cNvPicPr>
+          <p:nvPr/>
+        </p:nvPicPr>
+        <p:blipFill>
+          <a:blip r:embed="rId3"/>
+          <a:stretch>
+            <a:fillRect/>
+          </a:stretch>
+        </p:blipFill>
+        <p:spPr>
+          <a:xfrm>
+            <a:off x="5784235" y="1244019"/>
+            <a:ext cx="6301373" cy="4921511"/>
+          </a:xfrm>
+          <a:prstGeom prst="rect">
+            <a:avLst/>
+          </a:prstGeom>
+        </p:spPr>
+      </p:pic>
     </p:spTree>
     <p:extLst>
       <p:ext uri="{BB962C8B-B14F-4D97-AF65-F5344CB8AC3E}">
         <p14:creationId xmlns:p14="http://schemas.microsoft.com/office/powerpoint/2010/main" val="2858803227"/>
+      </p:ext>
+    </p:extLst>
+  </p:cSld>
+  <p:clrMapOvr>
+    <a:masterClrMapping/>
+  </p:clrMapOvr>
+</p:sld>
+</file>
+
+<file path=ppt/slides/slide5.xml><?xml version="1.0" encoding="utf-8"?>
+<p:sld xmlns:a="http://schemas.openxmlformats.org/drawingml/2006/main" xmlns:r="http://schemas.openxmlformats.org/officeDocument/2006/relationships" xmlns:p="http://schemas.openxmlformats.org/presentationml/2006/main">
+  <p:cSld>
+    <p:spTree>
+      <p:nvGrpSpPr>
+        <p:cNvPr id="1" name=""/>
+        <p:cNvGrpSpPr/>
+        <p:nvPr/>
+      </p:nvGrpSpPr>
+      <p:grpSpPr>
+        <a:xfrm>
+          <a:off x="0" y="0"/>
+          <a:ext cx="0" cy="0"/>
+          <a:chOff x="0" y="0"/>
+          <a:chExt cx="0" cy="0"/>
+        </a:xfrm>
+      </p:grpSpPr>
+      <p:sp>
+        <p:nvSpPr>
+          <p:cNvPr id="2" name="Title 1">
+            <a:extLst>
+              <a:ext uri="{FF2B5EF4-FFF2-40B4-BE49-F238E27FC236}">
+                <a16:creationId xmlns:a16="http://schemas.microsoft.com/office/drawing/2014/main" id="{4EFC2804-9280-4FB2-9F1B-A96B7A7E8641}"/>
+              </a:ext>
+            </a:extLst>
+          </p:cNvPr>
+          <p:cNvSpPr>
+            <a:spLocks noGrp="1"/>
+          </p:cNvSpPr>
+          <p:nvPr>
+            <p:ph type="title"/>
+          </p:nvPr>
+        </p:nvSpPr>
+        <p:spPr/>
+        <p:txBody>
+          <a:bodyPr>
+            <a:normAutofit/>
+          </a:bodyPr>
+          <a:lstStyle/>
+          <a:p>
+            <a:r>
+              <a:rPr lang="en-US" dirty="0"/>
+              <a:t>Step2: In VS code create app.py file, </a:t>
+            </a:r>
+            <a:r>
+              <a:rPr lang="en-US" dirty="0" err="1"/>
+              <a:t>venv</a:t>
+            </a:r>
+            <a:r>
+              <a:rPr lang="en-US" dirty="0"/>
+              <a:t> and install packages using requirements.txt </a:t>
+            </a:r>
+          </a:p>
+        </p:txBody>
+      </p:sp>
+      <p:sp>
+        <p:nvSpPr>
+          <p:cNvPr id="3" name="Content Placeholder 2">
+            <a:extLst>
+              <a:ext uri="{FF2B5EF4-FFF2-40B4-BE49-F238E27FC236}">
+                <a16:creationId xmlns:a16="http://schemas.microsoft.com/office/drawing/2014/main" id="{23BAAD24-8DAE-4DBF-9877-BC75E13A7249}"/>
+              </a:ext>
+            </a:extLst>
+          </p:cNvPr>
+          <p:cNvSpPr>
+            <a:spLocks noGrp="1"/>
+          </p:cNvSpPr>
+          <p:nvPr>
+            <p:ph idx="1"/>
+          </p:nvPr>
+        </p:nvSpPr>
+        <p:spPr/>
+        <p:txBody>
+          <a:bodyPr>
+            <a:normAutofit/>
+          </a:bodyPr>
+          <a:lstStyle/>
+          <a:p>
+            <a:endParaRPr lang="en-US" dirty="0"/>
+          </a:p>
+          <a:p>
+            <a:endParaRPr lang="en-US" dirty="0"/>
+          </a:p>
+          <a:p>
+            <a:endParaRPr lang="en-US" dirty="0"/>
+          </a:p>
+          <a:p>
+            <a:endParaRPr lang="en-US" dirty="0"/>
+          </a:p>
+          <a:p>
+            <a:endParaRPr lang="en-US" dirty="0"/>
+          </a:p>
+        </p:txBody>
+      </p:sp>
+      <p:pic>
+        <p:nvPicPr>
+          <p:cNvPr id="4" name="Picture 3">
+            <a:extLst>
+              <a:ext uri="{FF2B5EF4-FFF2-40B4-BE49-F238E27FC236}">
+                <a16:creationId xmlns:a16="http://schemas.microsoft.com/office/drawing/2014/main" id="{11807FA7-3621-4A39-A4FC-5EAA8B20F757}"/>
+              </a:ext>
+            </a:extLst>
+          </p:cNvPr>
+          <p:cNvPicPr>
+            <a:picLocks noChangeAspect="1"/>
+          </p:cNvPicPr>
+          <p:nvPr/>
+        </p:nvPicPr>
+        <p:blipFill>
+          <a:blip r:embed="rId2"/>
+          <a:stretch>
+            <a:fillRect/>
+          </a:stretch>
+        </p:blipFill>
+        <p:spPr>
+          <a:xfrm>
+            <a:off x="838200" y="2765084"/>
+            <a:ext cx="4915153" cy="1638384"/>
+          </a:xfrm>
+          <a:prstGeom prst="rect">
+            <a:avLst/>
+          </a:prstGeom>
+        </p:spPr>
+      </p:pic>
+    </p:spTree>
+    <p:extLst>
+      <p:ext uri="{BB962C8B-B14F-4D97-AF65-F5344CB8AC3E}">
+        <p14:creationId xmlns:p14="http://schemas.microsoft.com/office/powerpoint/2010/main" val="2906971328"/>
+      </p:ext>
+    </p:extLst>
+  </p:cSld>
+  <p:clrMapOvr>
+    <a:masterClrMapping/>
+  </p:clrMapOvr>
+</p:sld>
+</file>
+
+<file path=ppt/slides/slide6.xml><?xml version="1.0" encoding="utf-8"?>
+<p:sld xmlns:a="http://schemas.openxmlformats.org/drawingml/2006/main" xmlns:r="http://schemas.openxmlformats.org/officeDocument/2006/relationships" xmlns:p="http://schemas.openxmlformats.org/presentationml/2006/main">
+  <p:cSld>
+    <p:spTree>
+      <p:nvGrpSpPr>
+        <p:cNvPr id="1" name=""/>
+        <p:cNvGrpSpPr/>
+        <p:nvPr/>
+      </p:nvGrpSpPr>
+      <p:grpSpPr>
+        <a:xfrm>
+          <a:off x="0" y="0"/>
+          <a:ext cx="0" cy="0"/>
+          <a:chOff x="0" y="0"/>
+          <a:chExt cx="0" cy="0"/>
+        </a:xfrm>
+      </p:grpSpPr>
+      <p:sp>
+        <p:nvSpPr>
+          <p:cNvPr id="2" name="Title 1">
+            <a:extLst>
+              <a:ext uri="{FF2B5EF4-FFF2-40B4-BE49-F238E27FC236}">
+                <a16:creationId xmlns:a16="http://schemas.microsoft.com/office/drawing/2014/main" id="{95B6CEEB-B402-4095-B89B-ABA284F95114}"/>
+              </a:ext>
+            </a:extLst>
+          </p:cNvPr>
+          <p:cNvSpPr>
+            <a:spLocks noGrp="1"/>
+          </p:cNvSpPr>
+          <p:nvPr>
+            <p:ph type="title"/>
+          </p:nvPr>
+        </p:nvSpPr>
+        <p:spPr/>
+        <p:txBody>
+          <a:bodyPr>
+            <a:normAutofit fontScale="90000"/>
+          </a:bodyPr>
+          <a:lstStyle/>
+          <a:p>
+            <a:r>
+              <a:rPr lang="en-US" dirty="0"/>
+              <a:t>Step3: Paste the code in lambda function code environment. Create </a:t>
+            </a:r>
+            <a:r>
+              <a:rPr lang="en-US" dirty="0" err="1"/>
+              <a:t>boto</a:t>
+            </a:r>
+            <a:r>
+              <a:rPr lang="en-US" dirty="0"/>
+              <a:t> layer then add from dropdown.</a:t>
+            </a:r>
+          </a:p>
+        </p:txBody>
+      </p:sp>
+      <p:pic>
+        <p:nvPicPr>
+          <p:cNvPr id="4" name="Content Placeholder 3">
+            <a:extLst>
+              <a:ext uri="{FF2B5EF4-FFF2-40B4-BE49-F238E27FC236}">
+                <a16:creationId xmlns:a16="http://schemas.microsoft.com/office/drawing/2014/main" id="{1B9E2C2E-ABDE-4AD5-BC3E-7282AB8008D5}"/>
+              </a:ext>
+            </a:extLst>
+          </p:cNvPr>
+          <p:cNvPicPr>
+            <a:picLocks noGrp="1" noChangeAspect="1"/>
+          </p:cNvPicPr>
+          <p:nvPr>
+            <p:ph idx="1"/>
+          </p:nvPr>
+        </p:nvPicPr>
+        <p:blipFill>
+          <a:blip r:embed="rId2"/>
+          <a:stretch>
+            <a:fillRect/>
+          </a:stretch>
+        </p:blipFill>
+        <p:spPr>
+          <a:xfrm>
+            <a:off x="838201" y="1930838"/>
+            <a:ext cx="6192328" cy="727860"/>
+          </a:xfrm>
+          <a:prstGeom prst="rect">
+            <a:avLst/>
+          </a:prstGeom>
+        </p:spPr>
+      </p:pic>
+      <p:pic>
+        <p:nvPicPr>
+          <p:cNvPr id="5" name="Picture 4">
+            <a:extLst>
+              <a:ext uri="{FF2B5EF4-FFF2-40B4-BE49-F238E27FC236}">
+                <a16:creationId xmlns:a16="http://schemas.microsoft.com/office/drawing/2014/main" id="{9D0E39B7-462D-4F76-A99B-391AED285126}"/>
+              </a:ext>
+            </a:extLst>
+          </p:cNvPr>
+          <p:cNvPicPr>
+            <a:picLocks noChangeAspect="1"/>
+          </p:cNvPicPr>
+          <p:nvPr/>
+        </p:nvPicPr>
+        <p:blipFill>
+          <a:blip r:embed="rId3"/>
+          <a:stretch>
+            <a:fillRect/>
+          </a:stretch>
+        </p:blipFill>
+        <p:spPr>
+          <a:xfrm>
+            <a:off x="838200" y="2836611"/>
+            <a:ext cx="2914800" cy="3568883"/>
+          </a:xfrm>
+          <a:prstGeom prst="rect">
+            <a:avLst/>
+          </a:prstGeom>
+        </p:spPr>
+      </p:pic>
+      <p:pic>
+        <p:nvPicPr>
+          <p:cNvPr id="6" name="Picture 5">
+            <a:extLst>
+              <a:ext uri="{FF2B5EF4-FFF2-40B4-BE49-F238E27FC236}">
+                <a16:creationId xmlns:a16="http://schemas.microsoft.com/office/drawing/2014/main" id="{D6BDE04A-7E74-423D-AC14-949F97565CF0}"/>
+              </a:ext>
+            </a:extLst>
+          </p:cNvPr>
+          <p:cNvPicPr>
+            <a:picLocks noChangeAspect="1"/>
+          </p:cNvPicPr>
+          <p:nvPr/>
+        </p:nvPicPr>
+        <p:blipFill>
+          <a:blip r:embed="rId4"/>
+          <a:stretch>
+            <a:fillRect/>
+          </a:stretch>
+        </p:blipFill>
+        <p:spPr>
+          <a:xfrm>
+            <a:off x="7382707" y="1893405"/>
+            <a:ext cx="3107014" cy="2725994"/>
+          </a:xfrm>
+          <a:prstGeom prst="rect">
+            <a:avLst/>
+          </a:prstGeom>
+        </p:spPr>
+      </p:pic>
+      <p:pic>
+        <p:nvPicPr>
+          <p:cNvPr id="7" name="Picture 6">
+            <a:extLst>
+              <a:ext uri="{FF2B5EF4-FFF2-40B4-BE49-F238E27FC236}">
+                <a16:creationId xmlns:a16="http://schemas.microsoft.com/office/drawing/2014/main" id="{1AC96BF7-4BD9-4F7E-900E-FDA6906F1B75}"/>
+              </a:ext>
+            </a:extLst>
+          </p:cNvPr>
+          <p:cNvPicPr>
+            <a:picLocks noChangeAspect="1"/>
+          </p:cNvPicPr>
+          <p:nvPr/>
+        </p:nvPicPr>
+        <p:blipFill>
+          <a:blip r:embed="rId5"/>
+          <a:stretch>
+            <a:fillRect/>
+          </a:stretch>
+        </p:blipFill>
+        <p:spPr>
+          <a:xfrm>
+            <a:off x="7399313" y="4815827"/>
+            <a:ext cx="3954487" cy="1899922"/>
+          </a:xfrm>
+          <a:prstGeom prst="rect">
+            <a:avLst/>
+          </a:prstGeom>
+        </p:spPr>
+      </p:pic>
+    </p:spTree>
+    <p:extLst>
+      <p:ext uri="{BB962C8B-B14F-4D97-AF65-F5344CB8AC3E}">
+        <p14:creationId xmlns:p14="http://schemas.microsoft.com/office/powerpoint/2010/main" val="3251770883"/>
+      </p:ext>
+    </p:extLst>
+  </p:cSld>
+  <p:clrMapOvr>
+    <a:masterClrMapping/>
+  </p:clrMapOvr>
+</p:sld>
+</file>
+
+<file path=ppt/slides/slide7.xml><?xml version="1.0" encoding="utf-8"?>
+<p:sld xmlns:a="http://schemas.openxmlformats.org/drawingml/2006/main" xmlns:r="http://schemas.openxmlformats.org/officeDocument/2006/relationships" xmlns:p="http://schemas.openxmlformats.org/presentationml/2006/main">
+  <p:cSld>
+    <p:spTree>
+      <p:nvGrpSpPr>
+        <p:cNvPr id="1" name=""/>
+        <p:cNvGrpSpPr/>
+        <p:nvPr/>
+      </p:nvGrpSpPr>
+      <p:grpSpPr>
+        <a:xfrm>
+          <a:off x="0" y="0"/>
+          <a:ext cx="0" cy="0"/>
+          <a:chOff x="0" y="0"/>
+          <a:chExt cx="0" cy="0"/>
+        </a:xfrm>
+      </p:grpSpPr>
+      <p:sp>
+        <p:nvSpPr>
+          <p:cNvPr id="2" name="Title 1">
+            <a:extLst>
+              <a:ext uri="{FF2B5EF4-FFF2-40B4-BE49-F238E27FC236}">
+                <a16:creationId xmlns:a16="http://schemas.microsoft.com/office/drawing/2014/main" id="{D79CEB3E-79F4-4E46-8221-9409501118BF}"/>
+              </a:ext>
+            </a:extLst>
+          </p:cNvPr>
+          <p:cNvSpPr>
+            <a:spLocks noGrp="1"/>
+          </p:cNvSpPr>
+          <p:nvPr>
+            <p:ph type="title"/>
+          </p:nvPr>
+        </p:nvSpPr>
+        <p:spPr/>
+        <p:txBody>
+          <a:bodyPr/>
+          <a:lstStyle/>
+          <a:p>
+            <a:r>
+              <a:rPr lang="en-US" dirty="0"/>
+              <a:t>Adding Layers to lambda function.</a:t>
+            </a:r>
+          </a:p>
+        </p:txBody>
+      </p:sp>
+      <p:pic>
+        <p:nvPicPr>
+          <p:cNvPr id="4" name="Content Placeholder 3">
+            <a:extLst>
+              <a:ext uri="{FF2B5EF4-FFF2-40B4-BE49-F238E27FC236}">
+                <a16:creationId xmlns:a16="http://schemas.microsoft.com/office/drawing/2014/main" id="{11740B66-0992-4A40-9253-6C59FA83F07E}"/>
+              </a:ext>
+            </a:extLst>
+          </p:cNvPr>
+          <p:cNvPicPr>
+            <a:picLocks noGrp="1" noChangeAspect="1"/>
+          </p:cNvPicPr>
+          <p:nvPr>
+            <p:ph idx="1"/>
+          </p:nvPr>
+        </p:nvPicPr>
+        <p:blipFill>
+          <a:blip r:embed="rId2"/>
+          <a:stretch>
+            <a:fillRect/>
+          </a:stretch>
+        </p:blipFill>
+        <p:spPr>
+          <a:xfrm>
+            <a:off x="5043681" y="2156730"/>
+            <a:ext cx="6524341" cy="3287282"/>
+          </a:xfrm>
+          <a:prstGeom prst="rect">
+            <a:avLst/>
+          </a:prstGeom>
+        </p:spPr>
+      </p:pic>
+      <p:pic>
+        <p:nvPicPr>
+          <p:cNvPr id="5" name="Picture 4">
+            <a:extLst>
+              <a:ext uri="{FF2B5EF4-FFF2-40B4-BE49-F238E27FC236}">
+                <a16:creationId xmlns:a16="http://schemas.microsoft.com/office/drawing/2014/main" id="{233B91A2-1AE1-4E28-81A0-650B075527F0}"/>
+              </a:ext>
+            </a:extLst>
+          </p:cNvPr>
+          <p:cNvPicPr>
+            <a:picLocks noChangeAspect="1"/>
+          </p:cNvPicPr>
+          <p:nvPr/>
+        </p:nvPicPr>
+        <p:blipFill>
+          <a:blip r:embed="rId3"/>
+          <a:stretch>
+            <a:fillRect/>
+          </a:stretch>
+        </p:blipFill>
+        <p:spPr>
+          <a:xfrm>
+            <a:off x="838200" y="2156730"/>
+            <a:ext cx="4128406" cy="2501534"/>
+          </a:xfrm>
+          <a:prstGeom prst="rect">
+            <a:avLst/>
+          </a:prstGeom>
+        </p:spPr>
+      </p:pic>
+    </p:spTree>
+    <p:extLst>
+      <p:ext uri="{BB962C8B-B14F-4D97-AF65-F5344CB8AC3E}">
+        <p14:creationId xmlns:p14="http://schemas.microsoft.com/office/powerpoint/2010/main" val="109435695"/>
+      </p:ext>
+    </p:extLst>
+  </p:cSld>
+  <p:clrMapOvr>
+    <a:masterClrMapping/>
+  </p:clrMapOvr>
+</p:sld>
+</file>
+
+<file path=ppt/slides/slide8.xml><?xml version="1.0" encoding="utf-8"?>
+<p:sld xmlns:a="http://schemas.openxmlformats.org/drawingml/2006/main" xmlns:r="http://schemas.openxmlformats.org/officeDocument/2006/relationships" xmlns:p="http://schemas.openxmlformats.org/presentationml/2006/main">
+  <p:cSld>
+    <p:spTree>
+      <p:nvGrpSpPr>
+        <p:cNvPr id="1" name=""/>
+        <p:cNvGrpSpPr/>
+        <p:nvPr/>
+      </p:nvGrpSpPr>
+      <p:grpSpPr>
+        <a:xfrm>
+          <a:off x="0" y="0"/>
+          <a:ext cx="0" cy="0"/>
+          <a:chOff x="0" y="0"/>
+          <a:chExt cx="0" cy="0"/>
+        </a:xfrm>
+      </p:grpSpPr>
+      <p:sp>
+        <p:nvSpPr>
+          <p:cNvPr id="2" name="Title 1">
+            <a:extLst>
+              <a:ext uri="{FF2B5EF4-FFF2-40B4-BE49-F238E27FC236}">
+                <a16:creationId xmlns:a16="http://schemas.microsoft.com/office/drawing/2014/main" id="{F34BA230-B8E8-4309-BCAA-A33A1850519F}"/>
+              </a:ext>
+            </a:extLst>
+          </p:cNvPr>
+          <p:cNvSpPr>
+            <a:spLocks noGrp="1"/>
+          </p:cNvSpPr>
+          <p:nvPr>
+            <p:ph type="title"/>
+          </p:nvPr>
+        </p:nvSpPr>
+        <p:spPr/>
+        <p:txBody>
+          <a:bodyPr/>
+          <a:lstStyle/>
+          <a:p>
+            <a:endParaRPr lang="en-US"/>
+          </a:p>
+        </p:txBody>
+      </p:sp>
+      <p:sp>
+        <p:nvSpPr>
+          <p:cNvPr id="3" name="Content Placeholder 2">
+            <a:extLst>
+              <a:ext uri="{FF2B5EF4-FFF2-40B4-BE49-F238E27FC236}">
+                <a16:creationId xmlns:a16="http://schemas.microsoft.com/office/drawing/2014/main" id="{7703CEAE-2442-42B5-BA11-CE07D47AC376}"/>
+              </a:ext>
+            </a:extLst>
+          </p:cNvPr>
+          <p:cNvSpPr>
+            <a:spLocks noGrp="1"/>
+          </p:cNvSpPr>
+          <p:nvPr>
+            <p:ph idx="1"/>
+          </p:nvPr>
+        </p:nvSpPr>
+        <p:spPr/>
+        <p:txBody>
+          <a:bodyPr/>
+          <a:lstStyle/>
+          <a:p>
+            <a:endParaRPr lang="en-US"/>
+          </a:p>
+        </p:txBody>
+      </p:sp>
+    </p:spTree>
+    <p:extLst>
+      <p:ext uri="{BB962C8B-B14F-4D97-AF65-F5344CB8AC3E}">
+        <p14:creationId xmlns:p14="http://schemas.microsoft.com/office/powerpoint/2010/main" val="670745854"/>
+      </p:ext>
+    </p:extLst>
+  </p:cSld>
+  <p:clrMapOvr>
+    <a:masterClrMapping/>
+  </p:clrMapOvr>
+</p:sld>
+</file>
+
+<file path=ppt/slides/slide9.xml><?xml version="1.0" encoding="utf-8"?>
+<p:sld xmlns:a="http://schemas.openxmlformats.org/drawingml/2006/main" xmlns:r="http://schemas.openxmlformats.org/officeDocument/2006/relationships" xmlns:p="http://schemas.openxmlformats.org/presentationml/2006/main">
+  <p:cSld>
+    <p:spTree>
+      <p:nvGrpSpPr>
+        <p:cNvPr id="1" name=""/>
+        <p:cNvGrpSpPr/>
+        <p:nvPr/>
+      </p:nvGrpSpPr>
+      <p:grpSpPr>
+        <a:xfrm>
+          <a:off x="0" y="0"/>
+          <a:ext cx="0" cy="0"/>
+          <a:chOff x="0" y="0"/>
+          <a:chExt cx="0" cy="0"/>
+        </a:xfrm>
+      </p:grpSpPr>
+      <p:sp>
+        <p:nvSpPr>
+          <p:cNvPr id="2" name="Title 1">
+            <a:extLst>
+              <a:ext uri="{FF2B5EF4-FFF2-40B4-BE49-F238E27FC236}">
+                <a16:creationId xmlns:a16="http://schemas.microsoft.com/office/drawing/2014/main" id="{33BB1726-67BE-48B1-A46C-70865D002972}"/>
+              </a:ext>
+            </a:extLst>
+          </p:cNvPr>
+          <p:cNvSpPr>
+            <a:spLocks noGrp="1"/>
+          </p:cNvSpPr>
+          <p:nvPr>
+            <p:ph type="title"/>
+          </p:nvPr>
+        </p:nvSpPr>
+        <p:spPr/>
+        <p:txBody>
+          <a:bodyPr/>
+          <a:lstStyle/>
+          <a:p>
+            <a:r>
+              <a:rPr lang="en-US" dirty="0"/>
+              <a:t>Step4: Create the API gateway and add routes.</a:t>
+            </a:r>
+          </a:p>
+        </p:txBody>
+      </p:sp>
+      <p:pic>
+        <p:nvPicPr>
+          <p:cNvPr id="4" name="Content Placeholder 3">
+            <a:extLst>
+              <a:ext uri="{FF2B5EF4-FFF2-40B4-BE49-F238E27FC236}">
+                <a16:creationId xmlns:a16="http://schemas.microsoft.com/office/drawing/2014/main" id="{8EB32B87-28E0-4690-A475-7A9C15E0D216}"/>
+              </a:ext>
+            </a:extLst>
+          </p:cNvPr>
+          <p:cNvPicPr>
+            <a:picLocks noGrp="1" noChangeAspect="1"/>
+          </p:cNvPicPr>
+          <p:nvPr>
+            <p:ph idx="1"/>
+          </p:nvPr>
+        </p:nvPicPr>
+        <p:blipFill>
+          <a:blip r:embed="rId2"/>
+          <a:stretch>
+            <a:fillRect/>
+          </a:stretch>
+        </p:blipFill>
+        <p:spPr>
+          <a:xfrm>
+            <a:off x="838201" y="1540952"/>
+            <a:ext cx="4579188" cy="2168821"/>
+          </a:xfrm>
+          <a:prstGeom prst="rect">
+            <a:avLst/>
+          </a:prstGeom>
+        </p:spPr>
+      </p:pic>
+      <p:pic>
+        <p:nvPicPr>
+          <p:cNvPr id="5" name="Picture 4">
+            <a:extLst>
+              <a:ext uri="{FF2B5EF4-FFF2-40B4-BE49-F238E27FC236}">
+                <a16:creationId xmlns:a16="http://schemas.microsoft.com/office/drawing/2014/main" id="{66FD6CAE-3A42-4ADC-A0A9-14934A910A34}"/>
+              </a:ext>
+            </a:extLst>
+          </p:cNvPr>
+          <p:cNvPicPr>
+            <a:picLocks noChangeAspect="1"/>
+          </p:cNvPicPr>
+          <p:nvPr/>
+        </p:nvPicPr>
+        <p:blipFill>
+          <a:blip r:embed="rId3"/>
+          <a:stretch>
+            <a:fillRect/>
+          </a:stretch>
+        </p:blipFill>
+        <p:spPr>
+          <a:xfrm>
+            <a:off x="5619443" y="1537392"/>
+            <a:ext cx="5241213" cy="2172381"/>
+          </a:xfrm>
+          <a:prstGeom prst="rect">
+            <a:avLst/>
+          </a:prstGeom>
+        </p:spPr>
+      </p:pic>
+      <p:pic>
+        <p:nvPicPr>
+          <p:cNvPr id="6" name="Picture 5">
+            <a:extLst>
+              <a:ext uri="{FF2B5EF4-FFF2-40B4-BE49-F238E27FC236}">
+                <a16:creationId xmlns:a16="http://schemas.microsoft.com/office/drawing/2014/main" id="{9119D013-0DC5-484C-88E9-E0DD5F6670A1}"/>
+              </a:ext>
+            </a:extLst>
+          </p:cNvPr>
+          <p:cNvPicPr>
+            <a:picLocks noChangeAspect="1"/>
+          </p:cNvPicPr>
+          <p:nvPr/>
+        </p:nvPicPr>
+        <p:blipFill>
+          <a:blip r:embed="rId4"/>
+          <a:stretch>
+            <a:fillRect/>
+          </a:stretch>
+        </p:blipFill>
+        <p:spPr>
+          <a:xfrm>
+            <a:off x="838201" y="3877558"/>
+            <a:ext cx="10022456" cy="2878980"/>
+          </a:xfrm>
+          <a:prstGeom prst="rect">
+            <a:avLst/>
+          </a:prstGeom>
+        </p:spPr>
+      </p:pic>
+    </p:spTree>
+    <p:extLst>
+      <p:ext uri="{BB962C8B-B14F-4D97-AF65-F5344CB8AC3E}">
+        <p14:creationId xmlns:p14="http://schemas.microsoft.com/office/powerpoint/2010/main" val="2558195183"/>
       </p:ext>
     </p:extLst>
   </p:cSld>

</xml_diff>